<commit_message>
THIS IS THE END pt 2
</commit_message>
<xml_diff>
--- a/docs/Презентация.pptx
+++ b/docs/Презентация.pptx
@@ -3477,12 +3477,12 @@
       </p:grpSpPr>
       <p:pic>
         <p:nvPicPr>
-          <p:cNvPr id="5" name="Объект 4"/>
+          <p:cNvPr id="6" name="Объект 5"/>
           <p:cNvPicPr>
             <a:picLocks noGrp="1" noChangeAspect="1"/>
           </p:cNvPicPr>
           <p:nvPr>
-            <p:ph sz="half" idx="1"/>
+            <p:ph sz="half" idx="2"/>
           </p:nvPr>
         </p:nvPicPr>
         <p:blipFill>
@@ -3493,8 +3493,8 @@
         </p:blipFill>
         <p:spPr>
           <a:xfrm>
-            <a:off x="4747078" y="3125035"/>
-            <a:ext cx="2941680" cy="1896143"/>
+            <a:off x="1104357" y="1167898"/>
+            <a:ext cx="10227123" cy="853407"/>
           </a:xfrm>
           <a:prstGeom prst="rect">
             <a:avLst/>
@@ -3503,13 +3503,11 @@
       </p:pic>
       <p:pic>
         <p:nvPicPr>
-          <p:cNvPr id="6" name="Объект 5"/>
+          <p:cNvPr id="2" name="Рисунок 1"/>
           <p:cNvPicPr>
-            <a:picLocks noGrp="1" noChangeAspect="1"/>
+            <a:picLocks noChangeAspect="1"/>
           </p:cNvPicPr>
-          <p:nvPr>
-            <p:ph sz="half" idx="2"/>
-          </p:nvPr>
+          <p:nvPr/>
         </p:nvPicPr>
         <p:blipFill>
           <a:blip r:embed="rId3"/>
@@ -3519,8 +3517,8 @@
         </p:blipFill>
         <p:spPr>
           <a:xfrm>
-            <a:off x="1104357" y="1167898"/>
-            <a:ext cx="10227123" cy="853407"/>
+            <a:off x="4249385" y="3152689"/>
+            <a:ext cx="3937065" cy="1061864"/>
           </a:xfrm>
           <a:prstGeom prst="rect">
             <a:avLst/>

</xml_diff>

<commit_message>
THIS IS THE END pt 3
</commit_message>
<xml_diff>
--- a/docs/Презентация.pptx
+++ b/docs/Презентация.pptx
@@ -9,9 +9,11 @@
     <p:sldId id="257" r:id="rId3"/>
     <p:sldId id="258" r:id="rId4"/>
     <p:sldId id="259" r:id="rId5"/>
-    <p:sldId id="263" r:id="rId6"/>
-    <p:sldId id="264" r:id="rId7"/>
-    <p:sldId id="265" r:id="rId8"/>
+    <p:sldId id="266" r:id="rId6"/>
+    <p:sldId id="267" r:id="rId7"/>
+    <p:sldId id="263" r:id="rId8"/>
+    <p:sldId id="264" r:id="rId9"/>
+    <p:sldId id="265" r:id="rId10"/>
   </p:sldIdLst>
   <p:sldSz cx="12192000" cy="6858000"/>
   <p:notesSz cx="6858000" cy="9144000"/>
@@ -249,7 +251,7 @@
           <a:p>
             <a:fld id="{22C3EACB-B5D8-461C-A4EB-11C978850C47}" type="datetimeFigureOut">
               <a:rPr lang="ru-RU" smtClean="0"/>
-              <a:t>20.04.2023</a:t>
+              <a:t>24.04.2023</a:t>
             </a:fld>
             <a:endParaRPr lang="ru-RU"/>
           </a:p>
@@ -419,7 +421,7 @@
           <a:p>
             <a:fld id="{22C3EACB-B5D8-461C-A4EB-11C978850C47}" type="datetimeFigureOut">
               <a:rPr lang="ru-RU" smtClean="0"/>
-              <a:t>20.04.2023</a:t>
+              <a:t>24.04.2023</a:t>
             </a:fld>
             <a:endParaRPr lang="ru-RU"/>
           </a:p>
@@ -599,7 +601,7 @@
           <a:p>
             <a:fld id="{22C3EACB-B5D8-461C-A4EB-11C978850C47}" type="datetimeFigureOut">
               <a:rPr lang="ru-RU" smtClean="0"/>
-              <a:t>20.04.2023</a:t>
+              <a:t>24.04.2023</a:t>
             </a:fld>
             <a:endParaRPr lang="ru-RU"/>
           </a:p>
@@ -769,7 +771,7 @@
           <a:p>
             <a:fld id="{22C3EACB-B5D8-461C-A4EB-11C978850C47}" type="datetimeFigureOut">
               <a:rPr lang="ru-RU" smtClean="0"/>
-              <a:t>20.04.2023</a:t>
+              <a:t>24.04.2023</a:t>
             </a:fld>
             <a:endParaRPr lang="ru-RU"/>
           </a:p>
@@ -1015,7 +1017,7 @@
           <a:p>
             <a:fld id="{22C3EACB-B5D8-461C-A4EB-11C978850C47}" type="datetimeFigureOut">
               <a:rPr lang="ru-RU" smtClean="0"/>
-              <a:t>20.04.2023</a:t>
+              <a:t>24.04.2023</a:t>
             </a:fld>
             <a:endParaRPr lang="ru-RU"/>
           </a:p>
@@ -1247,7 +1249,7 @@
           <a:p>
             <a:fld id="{22C3EACB-B5D8-461C-A4EB-11C978850C47}" type="datetimeFigureOut">
               <a:rPr lang="ru-RU" smtClean="0"/>
-              <a:t>20.04.2023</a:t>
+              <a:t>24.04.2023</a:t>
             </a:fld>
             <a:endParaRPr lang="ru-RU"/>
           </a:p>
@@ -1614,7 +1616,7 @@
           <a:p>
             <a:fld id="{22C3EACB-B5D8-461C-A4EB-11C978850C47}" type="datetimeFigureOut">
               <a:rPr lang="ru-RU" smtClean="0"/>
-              <a:t>20.04.2023</a:t>
+              <a:t>24.04.2023</a:t>
             </a:fld>
             <a:endParaRPr lang="ru-RU"/>
           </a:p>
@@ -1732,7 +1734,7 @@
           <a:p>
             <a:fld id="{22C3EACB-B5D8-461C-A4EB-11C978850C47}" type="datetimeFigureOut">
               <a:rPr lang="ru-RU" smtClean="0"/>
-              <a:t>20.04.2023</a:t>
+              <a:t>24.04.2023</a:t>
             </a:fld>
             <a:endParaRPr lang="ru-RU"/>
           </a:p>
@@ -1827,7 +1829,7 @@
           <a:p>
             <a:fld id="{22C3EACB-B5D8-461C-A4EB-11C978850C47}" type="datetimeFigureOut">
               <a:rPr lang="ru-RU" smtClean="0"/>
-              <a:t>20.04.2023</a:t>
+              <a:t>24.04.2023</a:t>
             </a:fld>
             <a:endParaRPr lang="ru-RU"/>
           </a:p>
@@ -2104,7 +2106,7 @@
           <a:p>
             <a:fld id="{22C3EACB-B5D8-461C-A4EB-11C978850C47}" type="datetimeFigureOut">
               <a:rPr lang="ru-RU" smtClean="0"/>
-              <a:t>20.04.2023</a:t>
+              <a:t>24.04.2023</a:t>
             </a:fld>
             <a:endParaRPr lang="ru-RU"/>
           </a:p>
@@ -2357,7 +2359,7 @@
           <a:p>
             <a:fld id="{22C3EACB-B5D8-461C-A4EB-11C978850C47}" type="datetimeFigureOut">
               <a:rPr lang="ru-RU" smtClean="0"/>
-              <a:t>20.04.2023</a:t>
+              <a:t>24.04.2023</a:t>
             </a:fld>
             <a:endParaRPr lang="ru-RU"/>
           </a:p>
@@ -2570,7 +2572,7 @@
           <a:p>
             <a:fld id="{22C3EACB-B5D8-461C-A4EB-11C978850C47}" type="datetimeFigureOut">
               <a:rPr lang="ru-RU" smtClean="0"/>
-              <a:t>20.04.2023</a:t>
+              <a:t>24.04.2023</a:t>
             </a:fld>
             <a:endParaRPr lang="ru-RU"/>
           </a:p>
@@ -3218,8 +3220,16 @@
               <a:buNone/>
             </a:pPr>
             <a:r>
+              <a:rPr lang="en-US" dirty="0" smtClean="0"/>
+              <a:t>.</a:t>
+            </a:r>
+            <a:r>
+              <a:rPr lang="en-US" dirty="0" err="1"/>
+              <a:t>p</a:t>
+            </a:r>
+            <a:r>
               <a:rPr lang="en-US" dirty="0" err="1" smtClean="0"/>
-              <a:t>Py</a:t>
+              <a:t>y</a:t>
             </a:r>
             <a:r>
               <a:rPr lang="en-US" dirty="0" smtClean="0"/>
@@ -3235,8 +3245,16 @@
               <a:buNone/>
             </a:pPr>
             <a:r>
+              <a:rPr lang="en-US" dirty="0" smtClean="0"/>
+              <a:t>.</a:t>
+            </a:r>
+            <a:r>
+              <a:rPr lang="en-US" dirty="0" err="1"/>
+              <a:t>p</a:t>
+            </a:r>
+            <a:r>
               <a:rPr lang="en-US" dirty="0" err="1" smtClean="0"/>
-              <a:t>Py</a:t>
+              <a:t>y</a:t>
             </a:r>
             <a:r>
               <a:rPr lang="en-US" dirty="0" smtClean="0"/>
@@ -3278,13 +3296,9 @@
             </a:r>
             <a:r>
               <a:rPr lang="ru-RU" dirty="0" smtClean="0"/>
-              <a:t>, хранящая все изображения, </a:t>
-            </a:r>
-            <a:r>
-              <a:rPr lang="ru-RU" smtClean="0"/>
-              <a:t>необходимые для бота</a:t>
-            </a:r>
-            <a:endParaRPr lang="ru-RU"/>
+              <a:t>, хранящая все изображения, необходимые для бота</a:t>
+            </a:r>
+            <a:endParaRPr lang="ru-RU" dirty="0"/>
           </a:p>
         </p:txBody>
       </p:sp>
@@ -3406,9 +3420,30 @@
               <a:t>Vk_Bot</a:t>
             </a:r>
             <a:r>
+              <a:rPr lang="ru-RU" dirty="0" smtClean="0"/>
+              <a:t>(</a:t>
+            </a:r>
+            <a:r>
+              <a:rPr lang="en-US" dirty="0" smtClean="0"/>
+              <a:t>server.py – </a:t>
+            </a:r>
+            <a:r>
+              <a:rPr lang="ru-RU" dirty="0" smtClean="0"/>
+              <a:t>для </a:t>
+            </a:r>
+            <a:r>
+              <a:rPr lang="en-US" dirty="0" smtClean="0"/>
+              <a:t>Glitch</a:t>
+            </a:r>
+            <a:r>
+              <a:rPr lang="ru-RU" dirty="0" smtClean="0"/>
+              <a:t>)</a:t>
+            </a:r>
+            <a:r>
               <a:rPr lang="en-US" dirty="0" smtClean="0"/>
               <a:t>:</a:t>
             </a:r>
+            <a:endParaRPr lang="en-US" dirty="0" smtClean="0"/>
           </a:p>
           <a:p>
             <a:pPr marL="0" indent="0">
@@ -3475,9 +3510,82 @@
           <a:chExt cx="0" cy="0"/>
         </a:xfrm>
       </p:grpSpPr>
+      <p:sp>
+        <p:nvSpPr>
+          <p:cNvPr id="2" name="Заголовок 1"/>
+          <p:cNvSpPr>
+            <a:spLocks noGrp="1"/>
+          </p:cNvSpPr>
+          <p:nvPr>
+            <p:ph type="title"/>
+          </p:nvPr>
+        </p:nvSpPr>
+        <p:spPr/>
+        <p:txBody>
+          <a:bodyPr/>
+          <a:lstStyle/>
+          <a:p>
+            <a:pPr algn="ctr"/>
+            <a:r>
+              <a:rPr lang="ru-RU" b="1" dirty="0" smtClean="0"/>
+              <a:t>Хостинг</a:t>
+            </a:r>
+            <a:endParaRPr lang="ru-RU" b="1" dirty="0"/>
+          </a:p>
+        </p:txBody>
+      </p:sp>
+      <p:sp>
+        <p:nvSpPr>
+          <p:cNvPr id="3" name="Объект 2"/>
+          <p:cNvSpPr>
+            <a:spLocks noGrp="1"/>
+          </p:cNvSpPr>
+          <p:nvPr>
+            <p:ph sz="half" idx="1"/>
+          </p:nvPr>
+        </p:nvSpPr>
+        <p:spPr/>
+        <p:txBody>
+          <a:bodyPr>
+            <a:normAutofit fontScale="92500" lnSpcReduction="10000"/>
+          </a:bodyPr>
+          <a:lstStyle/>
+          <a:p>
+            <a:pPr marL="0" indent="0">
+              <a:buNone/>
+            </a:pPr>
+            <a:r>
+              <a:rPr lang="ru-RU" dirty="0" smtClean="0"/>
+              <a:t>В качестве хостинга мы решили использовать </a:t>
+            </a:r>
+            <a:r>
+              <a:rPr lang="en-US" dirty="0" smtClean="0"/>
+              <a:t>Glitch</a:t>
+            </a:r>
+            <a:r>
+              <a:rPr lang="ru-RU" dirty="0"/>
+              <a:t> </a:t>
+            </a:r>
+            <a:r>
+              <a:rPr lang="ru-RU" dirty="0" smtClean="0"/>
+              <a:t>ввиду простоты его использования и отсутствия достойных БЕСПЛАТНЫХ альтернатив</a:t>
+            </a:r>
+          </a:p>
+          <a:p>
+            <a:pPr marL="0" indent="0">
+              <a:buNone/>
+            </a:pPr>
+            <a:r>
+              <a:rPr lang="ru-RU" dirty="0" smtClean="0"/>
+              <a:t>Из-за того, что сайт предоставляет бесплатные услуги, вводится ряд ограничений, такие как: 1000 часов хостинга в месяц, приостановка проекта через 5 минут бездействия(что собственно и создает проблемы работы нашего проекта)</a:t>
+            </a:r>
+            <a:endParaRPr lang="ru-RU" dirty="0"/>
+          </a:p>
+        </p:txBody>
+      </p:sp>
       <p:pic>
         <p:nvPicPr>
-          <p:cNvPr id="6" name="Объект 5"/>
+          <p:cNvPr id="5" name="Объект 4"/>
           <p:cNvPicPr>
             <a:picLocks noGrp="1" noChangeAspect="1"/>
           </p:cNvPicPr>
@@ -3493,7 +3601,117 @@
         </p:blipFill>
         <p:spPr>
           <a:xfrm>
-            <a:off x="1104357" y="1167898"/>
+            <a:off x="6096000" y="3218310"/>
+            <a:ext cx="5898801" cy="1565968"/>
+          </a:xfrm>
+          <a:prstGeom prst="rect">
+            <a:avLst/>
+          </a:prstGeom>
+        </p:spPr>
+      </p:pic>
+    </p:spTree>
+    <p:extLst>
+      <p:ext uri="{BB962C8B-B14F-4D97-AF65-F5344CB8AC3E}">
+        <p14:creationId xmlns:p14="http://schemas.microsoft.com/office/powerpoint/2010/main" val="3146649140"/>
+      </p:ext>
+    </p:extLst>
+  </p:cSld>
+  <p:clrMapOvr>
+    <a:masterClrMapping/>
+  </p:clrMapOvr>
+</p:sld>
+</file>
+
+<file path=ppt/slides/slide6.xml><?xml version="1.0" encoding="utf-8"?>
+<p:sld xmlns:a="http://schemas.openxmlformats.org/drawingml/2006/main" xmlns:r="http://schemas.openxmlformats.org/officeDocument/2006/relationships" xmlns:p="http://schemas.openxmlformats.org/presentationml/2006/main">
+  <p:cSld>
+    <p:spTree>
+      <p:nvGrpSpPr>
+        <p:cNvPr id="1" name=""/>
+        <p:cNvGrpSpPr/>
+        <p:nvPr/>
+      </p:nvGrpSpPr>
+      <p:grpSpPr>
+        <a:xfrm>
+          <a:off x="0" y="0"/>
+          <a:ext cx="0" cy="0"/>
+          <a:chOff x="0" y="0"/>
+          <a:chExt cx="0" cy="0"/>
+        </a:xfrm>
+      </p:grpSpPr>
+      <p:pic>
+        <p:nvPicPr>
+          <p:cNvPr id="4" name="Рисунок 3"/>
+          <p:cNvPicPr>
+            <a:picLocks noChangeAspect="1"/>
+          </p:cNvPicPr>
+          <p:nvPr/>
+        </p:nvPicPr>
+        <p:blipFill>
+          <a:blip r:embed="rId2"/>
+          <a:stretch>
+            <a:fillRect/>
+          </a:stretch>
+        </p:blipFill>
+        <p:spPr>
+          <a:xfrm>
+            <a:off x="1916861" y="128413"/>
+            <a:ext cx="7850593" cy="6577525"/>
+          </a:xfrm>
+          <a:prstGeom prst="rect">
+            <a:avLst/>
+          </a:prstGeom>
+        </p:spPr>
+      </p:pic>
+    </p:spTree>
+    <p:extLst>
+      <p:ext uri="{BB962C8B-B14F-4D97-AF65-F5344CB8AC3E}">
+        <p14:creationId xmlns:p14="http://schemas.microsoft.com/office/powerpoint/2010/main" val="1183875287"/>
+      </p:ext>
+    </p:extLst>
+  </p:cSld>
+  <p:clrMapOvr>
+    <a:masterClrMapping/>
+  </p:clrMapOvr>
+</p:sld>
+</file>
+
+<file path=ppt/slides/slide7.xml><?xml version="1.0" encoding="utf-8"?>
+<p:sld xmlns:a="http://schemas.openxmlformats.org/drawingml/2006/main" xmlns:r="http://schemas.openxmlformats.org/officeDocument/2006/relationships" xmlns:p="http://schemas.openxmlformats.org/presentationml/2006/main">
+  <p:cSld>
+    <p:spTree>
+      <p:nvGrpSpPr>
+        <p:cNvPr id="1" name=""/>
+        <p:cNvGrpSpPr/>
+        <p:nvPr/>
+      </p:nvGrpSpPr>
+      <p:grpSpPr>
+        <a:xfrm>
+          <a:off x="0" y="0"/>
+          <a:ext cx="0" cy="0"/>
+          <a:chOff x="0" y="0"/>
+          <a:chExt cx="0" cy="0"/>
+        </a:xfrm>
+      </p:grpSpPr>
+      <p:pic>
+        <p:nvPicPr>
+          <p:cNvPr id="6" name="Объект 5"/>
+          <p:cNvPicPr>
+            <a:picLocks noGrp="1" noChangeAspect="1"/>
+          </p:cNvPicPr>
+          <p:nvPr>
+            <p:ph sz="half" idx="2"/>
+          </p:nvPr>
+        </p:nvPicPr>
+        <p:blipFill>
+          <a:blip r:embed="rId2"/>
+          <a:stretch>
+            <a:fillRect/>
+          </a:stretch>
+        </p:blipFill>
+        <p:spPr>
+          <a:xfrm>
+            <a:off x="1104355" y="2107237"/>
             <a:ext cx="10227123" cy="853407"/>
           </a:xfrm>
           <a:prstGeom prst="rect">
@@ -3517,7 +3735,7 @@
         </p:blipFill>
         <p:spPr>
           <a:xfrm>
-            <a:off x="4249385" y="3152689"/>
+            <a:off x="4249385" y="3867584"/>
             <a:ext cx="3937065" cy="1061864"/>
           </a:xfrm>
           <a:prstGeom prst="rect">
@@ -3545,7 +3763,7 @@
 </p:sld>
 </file>
 
-<file path=ppt/slides/slide6.xml><?xml version="1.0" encoding="utf-8"?>
+<file path=ppt/slides/slide8.xml><?xml version="1.0" encoding="utf-8"?>
 <p:sld xmlns:a="http://schemas.openxmlformats.org/drawingml/2006/main" xmlns:r="http://schemas.openxmlformats.org/officeDocument/2006/relationships" xmlns:p="http://schemas.openxmlformats.org/presentationml/2006/main">
   <p:cSld>
     <p:spTree>
@@ -3634,7 +3852,7 @@
 </p:sld>
 </file>
 
-<file path=ppt/slides/slide7.xml><?xml version="1.0" encoding="utf-8"?>
+<file path=ppt/slides/slide9.xml><?xml version="1.0" encoding="utf-8"?>
 <p:sld xmlns:a="http://schemas.openxmlformats.org/drawingml/2006/main" xmlns:r="http://schemas.openxmlformats.org/officeDocument/2006/relationships" xmlns:p="http://schemas.openxmlformats.org/presentationml/2006/main">
   <p:cSld>
     <p:spTree>

</xml_diff>